<commit_message>
Improved poster Abstract and added Previous Solution
</commit_message>
<xml_diff>
--- a/documentation/Poster.pptx
+++ b/documentation/Poster.pptx
@@ -121,6 +121,91 @@
     </p:ext>
   </p:extLst>
 </p:presentation>
+</file>
+
+<file path=ppt/revisionInfo.xml><?xml version="1.0" encoding="utf-8"?>
+<p1510:revInfo xmlns:a="http://schemas.openxmlformats.org/drawingml/2006/main" xmlns:r="http://schemas.openxmlformats.org/officeDocument/2006/relationships" xmlns:p1510="http://schemas.microsoft.com/office/powerpoint/2015/10/main">
+  <p1510:revLst>
+    <p1510:client id="{27D5CA3F-5A32-4D2C-B1C4-6497C6724676}" v="7" dt="2025-04-09T00:06:19.390"/>
+  </p1510:revLst>
+</p1510:revInfo>
+</file>
+
+<file path=ppt/changesInfos/changesInfo1.xml><?xml version="1.0" encoding="utf-8"?>
+<pc:chgInfo xmlns:a="http://schemas.openxmlformats.org/drawingml/2006/main" xmlns:r="http://schemas.openxmlformats.org/officeDocument/2006/relationships" xmlns:ac="http://schemas.microsoft.com/office/drawing/2013/main/command" xmlns:pc="http://schemas.microsoft.com/office/powerpoint/2013/main/command">
+  <pc:docChgLst>
+    <pc:chgData name="Erik Holtrop" userId="7c610102d569593a" providerId="LiveId" clId="{27D5CA3F-5A32-4D2C-B1C4-6497C6724676}"/>
+    <pc:docChg chg="undo custSel modSld">
+      <pc:chgData name="Erik Holtrop" userId="7c610102d569593a" providerId="LiveId" clId="{27D5CA3F-5A32-4D2C-B1C4-6497C6724676}" dt="2025-04-09T00:07:09.041" v="602" actId="1076"/>
+      <pc:docMkLst>
+        <pc:docMk/>
+      </pc:docMkLst>
+      <pc:sldChg chg="addSp delSp modSp mod">
+        <pc:chgData name="Erik Holtrop" userId="7c610102d569593a" providerId="LiveId" clId="{27D5CA3F-5A32-4D2C-B1C4-6497C6724676}" dt="2025-04-09T00:07:09.041" v="602" actId="1076"/>
+        <pc:sldMkLst>
+          <pc:docMk/>
+          <pc:sldMk cId="0" sldId="256"/>
+        </pc:sldMkLst>
+        <pc:spChg chg="mod">
+          <ac:chgData name="Erik Holtrop" userId="7c610102d569593a" providerId="LiveId" clId="{27D5CA3F-5A32-4D2C-B1C4-6497C6724676}" dt="2025-04-09T00:07:05.031" v="601" actId="14100"/>
+          <ac:spMkLst>
+            <pc:docMk/>
+            <pc:sldMk cId="0" sldId="256"/>
+            <ac:spMk id="3" creationId="{02DB5755-5428-F4DC-1B93-8D7323161E59}"/>
+          </ac:spMkLst>
+        </pc:spChg>
+        <pc:spChg chg="add mod">
+          <ac:chgData name="Erik Holtrop" userId="7c610102d569593a" providerId="LiveId" clId="{27D5CA3F-5A32-4D2C-B1C4-6497C6724676}" dt="2025-04-08T23:41:15.972" v="523" actId="1076"/>
+          <ac:spMkLst>
+            <pc:docMk/>
+            <pc:sldMk cId="0" sldId="256"/>
+            <ac:spMk id="5" creationId="{E19D6BF5-EA69-C338-7092-7D0A8F6DC9A0}"/>
+          </ac:spMkLst>
+        </pc:spChg>
+        <pc:spChg chg="add mod">
+          <ac:chgData name="Erik Holtrop" userId="7c610102d569593a" providerId="LiveId" clId="{27D5CA3F-5A32-4D2C-B1C4-6497C6724676}" dt="2025-04-09T00:06:47.247" v="597" actId="20577"/>
+          <ac:spMkLst>
+            <pc:docMk/>
+            <pc:sldMk cId="0" sldId="256"/>
+            <ac:spMk id="10" creationId="{5D176213-BCDD-D5D2-DC7F-9FF1FBD11938}"/>
+          </ac:spMkLst>
+        </pc:spChg>
+        <pc:spChg chg="mod">
+          <ac:chgData name="Erik Holtrop" userId="7c610102d569593a" providerId="LiveId" clId="{27D5CA3F-5A32-4D2C-B1C4-6497C6724676}" dt="2025-04-08T23:43:16.512" v="544" actId="14100"/>
+          <ac:spMkLst>
+            <pc:docMk/>
+            <pc:sldMk cId="0" sldId="256"/>
+            <ac:spMk id="18" creationId="{00000000-0000-0000-0000-000000000000}"/>
+          </ac:spMkLst>
+        </pc:spChg>
+        <pc:grpChg chg="add mod">
+          <ac:chgData name="Erik Holtrop" userId="7c610102d569593a" providerId="LiveId" clId="{27D5CA3F-5A32-4D2C-B1C4-6497C6724676}" dt="2025-04-09T00:07:09.041" v="602" actId="1076"/>
+          <ac:grpSpMkLst>
+            <pc:docMk/>
+            <pc:sldMk cId="0" sldId="256"/>
+            <ac:grpSpMk id="11" creationId="{87FAFD28-D657-131E-B7D1-05D234CD0704}"/>
+          </ac:grpSpMkLst>
+        </pc:grpChg>
+        <pc:picChg chg="add del mod">
+          <ac:chgData name="Erik Holtrop" userId="7c610102d569593a" providerId="LiveId" clId="{27D5CA3F-5A32-4D2C-B1C4-6497C6724676}" dt="2025-04-08T23:42:18.500" v="533" actId="21"/>
+          <ac:picMkLst>
+            <pc:docMk/>
+            <pc:sldMk cId="0" sldId="256"/>
+            <ac:picMk id="7" creationId="{3C19D4BF-49EF-D168-48DA-508F675C00B2}"/>
+          </ac:picMkLst>
+        </pc:picChg>
+        <pc:picChg chg="add mod">
+          <ac:chgData name="Erik Holtrop" userId="7c610102d569593a" providerId="LiveId" clId="{27D5CA3F-5A32-4D2C-B1C4-6497C6724676}" dt="2025-04-09T00:06:19.390" v="550" actId="164"/>
+          <ac:picMkLst>
+            <pc:docMk/>
+            <pc:sldMk cId="0" sldId="256"/>
+            <ac:picMk id="8" creationId="{3C19D4BF-49EF-D168-48DA-508F675C00B2}"/>
+          </ac:picMkLst>
+        </pc:picChg>
+      </pc:sldChg>
+    </pc:docChg>
+  </pc:docChgLst>
+</pc:chgInfo>
 </file>
 
 <file path=ppt/slideLayouts/slideLayout1.xml><?xml version="1.0" encoding="utf-8"?>
@@ -1197,7 +1282,7 @@
         <p:spPr>
           <a:xfrm>
             <a:off x="685800" y="5257801"/>
-            <a:ext cx="13844016" cy="9448800"/>
+            <a:ext cx="13844016" cy="8839199"/>
           </a:xfrm>
           <a:prstGeom prst="rect">
             <a:avLst/>
@@ -1212,7 +1297,7 @@
           </a:ln>
         </p:spPr>
         <p:txBody>
-          <a:bodyPr/>
+          <a:bodyPr anchor="ctr" anchorCtr="0"/>
           <a:lstStyle>
             <a:lvl1pPr algn="ctr">
               <a:buNone/>
@@ -1256,11 +1341,20 @@
             </a:pPr>
             <a:r>
               <a:rPr lang="en-US" sz="6000" kern="100" dirty="0">
+                <a:effectLst/>
                 <a:latin typeface="Aptos" panose="020B0004020202020204" pitchFamily="34" charset="0"/>
                 <a:ea typeface="Aptos" panose="020B0004020202020204" pitchFamily="34" charset="0"/>
                 <a:cs typeface="Aptos" panose="020B0004020202020204" pitchFamily="34" charset="0"/>
               </a:rPr>
-              <a:t>E</a:t>
+              <a:t>Process and </a:t>
+            </a:r>
+            <a:r>
+              <a:rPr lang="en-US" sz="6000" kern="100" dirty="0">
+                <a:latin typeface="Aptos" panose="020B0004020202020204" pitchFamily="34" charset="0"/>
+                <a:ea typeface="Aptos" panose="020B0004020202020204" pitchFamily="34" charset="0"/>
+                <a:cs typeface="Aptos" panose="020B0004020202020204" pitchFamily="34" charset="0"/>
+              </a:rPr>
+              <a:t>graph </a:t>
             </a:r>
             <a:r>
               <a:rPr lang="en-US" sz="6000" kern="100" dirty="0">
@@ -1269,7 +1363,7 @@
                 <a:ea typeface="Aptos" panose="020B0004020202020204" pitchFamily="34" charset="0"/>
                 <a:cs typeface="Aptos" panose="020B0004020202020204" pitchFamily="34" charset="0"/>
               </a:rPr>
-              <a:t>nhance the analysis and integration of mass spectrometer data </a:t>
+              <a:t>mass spectrometer data </a:t>
             </a:r>
           </a:p>
           <a:p>
@@ -1637,8 +1731,8 @@
         </p:nvSpPr>
         <p:spPr>
           <a:xfrm>
-            <a:off x="692426" y="15316200"/>
-            <a:ext cx="13844016" cy="16687800"/>
+            <a:off x="685800" y="14356948"/>
+            <a:ext cx="13844016" cy="7969652"/>
           </a:xfrm>
           <a:prstGeom prst="rect">
             <a:avLst/>
@@ -1698,7 +1792,21 @@
               <a:defRPr/>
             </a:pPr>
             <a:r>
-              <a:rPr kumimoji="0" lang="en-US" sz="5200" b="0" i="0" u="none" strike="noStrike" kern="1200" cap="none" spc="0" normalizeH="0" baseline="0" noProof="0">
+              <a:rPr lang="en-US" sz="6600" b="1" dirty="0">
+                <a:latin typeface="Aptos" panose="020B0004020202020204" pitchFamily="34" charset="0"/>
+              </a:rPr>
+              <a:t>Previous Solution: LabVIEW</a:t>
+            </a:r>
+          </a:p>
+          <a:p>
+            <a:pPr marL="1644650" indent="-947738">
+              <a:spcBef>
+                <a:spcPct val="20000"/>
+              </a:spcBef>
+              <a:defRPr/>
+            </a:pPr>
+            <a:r>
+              <a:rPr kumimoji="0" lang="en-US" sz="6000" b="0" i="0" u="none" strike="noStrike" kern="1200" cap="none" spc="0" normalizeH="0" baseline="0" noProof="0" dirty="0">
                 <a:ln>
                   <a:noFill/>
                 </a:ln>
@@ -1708,29 +1816,167 @@
                 <a:effectLst/>
                 <a:uLnTx/>
                 <a:uFillTx/>
-                <a:latin typeface="+mj-lt"/>
-                <a:ea typeface="+mn-ea"/>
-                <a:cs typeface="+mn-cs"/>
+                <a:latin typeface="Aptos" panose="020B0004020202020204" pitchFamily="34" charset="0"/>
               </a:rPr>
-              <a:t>df</a:t>
-            </a:r>
-            <a:endParaRPr kumimoji="0" lang="en-US" sz="5200" b="0" i="0" u="none" strike="noStrike" kern="1200" cap="none" spc="0" normalizeH="0" baseline="0" noProof="0" dirty="0">
-              <a:ln>
-                <a:noFill/>
-              </a:ln>
-              <a:solidFill>
-                <a:schemeClr val="tx1"/>
-              </a:solidFill>
-              <a:effectLst/>
-              <a:uLnTx/>
-              <a:uFillTx/>
-              <a:latin typeface="+mj-lt"/>
-              <a:ea typeface="+mn-ea"/>
-              <a:cs typeface="+mn-cs"/>
+              <a:t>Unfamiliar for newer generation of researchers/developers</a:t>
+            </a:r>
+          </a:p>
+          <a:p>
+            <a:pPr marL="1644650" indent="-947738">
+              <a:spcBef>
+                <a:spcPct val="20000"/>
+              </a:spcBef>
+              <a:defRPr/>
+            </a:pPr>
+            <a:r>
+              <a:rPr lang="en-US" sz="6000" dirty="0">
+                <a:latin typeface="Aptos" panose="020B0004020202020204" pitchFamily="34" charset="0"/>
+              </a:rPr>
+              <a:t>Limited flexibility and extendibility</a:t>
+            </a:r>
+          </a:p>
+          <a:p>
+            <a:pPr marL="2308225" lvl="1" indent="-827088">
+              <a:spcBef>
+                <a:spcPct val="20000"/>
+              </a:spcBef>
+              <a:buFont typeface="Arial" panose="020B0604020202020204" pitchFamily="34" charset="0"/>
+              <a:buChar char="•"/>
+              <a:defRPr/>
+            </a:pPr>
+            <a:r>
+              <a:rPr lang="en-US" sz="6000" dirty="0">
+                <a:latin typeface="Aptos" panose="020B0004020202020204" pitchFamily="34" charset="0"/>
+              </a:rPr>
+              <a:t>Git incompatibility</a:t>
+            </a:r>
+          </a:p>
+          <a:p>
+            <a:pPr marL="2308225" lvl="1" indent="-827088">
+              <a:spcBef>
+                <a:spcPct val="20000"/>
+              </a:spcBef>
+              <a:buFont typeface="Arial" panose="020B0604020202020204" pitchFamily="34" charset="0"/>
+              <a:buChar char="•"/>
+              <a:defRPr/>
+            </a:pPr>
+            <a:r>
+              <a:rPr lang="en-US" sz="6000" dirty="0">
+                <a:latin typeface="Aptos" panose="020B0004020202020204" pitchFamily="34" charset="0"/>
+              </a:rPr>
+              <a:t>Poor cross-platform support</a:t>
+            </a:r>
+            <a:endParaRPr lang="en-US" sz="3600" dirty="0">
+              <a:latin typeface="Aptos" panose="020B0004020202020204" pitchFamily="34" charset="0"/>
             </a:endParaRPr>
+          </a:p>
+          <a:p>
+            <a:pPr marL="1644650" indent="-947738">
+              <a:spcBef>
+                <a:spcPct val="20000"/>
+              </a:spcBef>
+              <a:defRPr/>
+            </a:pPr>
+            <a:r>
+              <a:rPr lang="en-US" sz="6000" dirty="0">
+                <a:latin typeface="Aptos" panose="020B0004020202020204" pitchFamily="34" charset="0"/>
+              </a:rPr>
+              <a:t>Paid Licensing</a:t>
+            </a:r>
           </a:p>
         </p:txBody>
       </p:sp>
+      <p:grpSp>
+        <p:nvGrpSpPr>
+          <p:cNvPr id="11" name="Group 10">
+            <a:extLst>
+              <a:ext uri="{FF2B5EF4-FFF2-40B4-BE49-F238E27FC236}">
+                <a16:creationId xmlns:a16="http://schemas.microsoft.com/office/drawing/2014/main" id="{87FAFD28-D657-131E-B7D1-05D234CD0704}"/>
+              </a:ext>
+            </a:extLst>
+          </p:cNvPr>
+          <p:cNvGrpSpPr/>
+          <p:nvPr/>
+        </p:nvGrpSpPr>
+        <p:grpSpPr>
+          <a:xfrm>
+            <a:off x="1432152" y="22937105"/>
+            <a:ext cx="12351312" cy="8989789"/>
+            <a:chOff x="1432152" y="23321988"/>
+            <a:chExt cx="12351312" cy="8989789"/>
+          </a:xfrm>
+        </p:grpSpPr>
+        <p:pic>
+          <p:nvPicPr>
+            <p:cNvPr id="8" name="Picture 7">
+              <a:extLst>
+                <a:ext uri="{FF2B5EF4-FFF2-40B4-BE49-F238E27FC236}">
+                  <a16:creationId xmlns:a16="http://schemas.microsoft.com/office/drawing/2014/main" id="{3C19D4BF-49EF-D168-48DA-508F675C00B2}"/>
+                </a:ext>
+              </a:extLst>
+            </p:cNvPr>
+            <p:cNvPicPr>
+              <a:picLocks noChangeAspect="1"/>
+            </p:cNvPicPr>
+            <p:nvPr/>
+          </p:nvPicPr>
+          <p:blipFill>
+            <a:blip r:embed="rId2"/>
+            <a:stretch>
+              <a:fillRect/>
+            </a:stretch>
+          </p:blipFill>
+          <p:spPr>
+            <a:xfrm>
+              <a:off x="1432152" y="23321988"/>
+              <a:ext cx="12351312" cy="7762823"/>
+            </a:xfrm>
+            <a:prstGeom prst="rect">
+              <a:avLst/>
+            </a:prstGeom>
+          </p:spPr>
+        </p:pic>
+        <p:sp>
+          <p:nvSpPr>
+            <p:cNvPr id="10" name="TextBox 9">
+              <a:extLst>
+                <a:ext uri="{FF2B5EF4-FFF2-40B4-BE49-F238E27FC236}">
+                  <a16:creationId xmlns:a16="http://schemas.microsoft.com/office/drawing/2014/main" id="{5D176213-BCDD-D5D2-DC7F-9FF1FBD11938}"/>
+                </a:ext>
+              </a:extLst>
+            </p:cNvPr>
+            <p:cNvSpPr txBox="1"/>
+            <p:nvPr/>
+          </p:nvSpPr>
+          <p:spPr>
+            <a:xfrm>
+              <a:off x="1432152" y="31296114"/>
+              <a:ext cx="12351312" cy="1015663"/>
+            </a:xfrm>
+            <a:prstGeom prst="rect">
+              <a:avLst/>
+            </a:prstGeom>
+            <a:noFill/>
+          </p:spPr>
+          <p:txBody>
+            <a:bodyPr wrap="square" rtlCol="0">
+              <a:spAutoFit/>
+            </a:bodyPr>
+            <a:lstStyle/>
+            <a:p>
+              <a:r>
+                <a:rPr lang="en-US" sz="6000" dirty="0">
+                  <a:latin typeface="Aptos" panose="020B0004020202020204" pitchFamily="34" charset="0"/>
+                </a:rPr>
+                <a:t>Figure 1: LabVIEW Screenshot</a:t>
+              </a:r>
+              <a:endParaRPr lang="en-US" dirty="0">
+                <a:latin typeface="Aptos" panose="020B0004020202020204" pitchFamily="34" charset="0"/>
+              </a:endParaRPr>
+            </a:p>
+          </p:txBody>
+        </p:sp>
+      </p:grpSp>
     </p:spTree>
   </p:cSld>
   <p:clrMapOvr>

</xml_diff>

<commit_message>
Added Solution Overview to Poster
</commit_message>
<xml_diff>
--- a/documentation/Poster.pptx
+++ b/documentation/Poster.pptx
@@ -126,7 +126,7 @@
 <file path=ppt/revisionInfo.xml><?xml version="1.0" encoding="utf-8"?>
 <p1510:revInfo xmlns:a="http://schemas.openxmlformats.org/drawingml/2006/main" xmlns:r="http://schemas.openxmlformats.org/officeDocument/2006/relationships" xmlns:p1510="http://schemas.microsoft.com/office/powerpoint/2015/10/main">
   <p1510:revLst>
-    <p1510:client id="{27D5CA3F-5A32-4D2C-B1C4-6497C6724676}" v="7" dt="2025-04-09T00:06:19.390"/>
+    <p1510:client id="{27D5CA3F-5A32-4D2C-B1C4-6497C6724676}" v="11" dt="2025-04-10T04:47:39.393"/>
   </p1510:revLst>
 </p1510:revInfo>
 </file>
@@ -136,16 +136,24 @@
   <pc:docChgLst>
     <pc:chgData name="Erik Holtrop" userId="7c610102d569593a" providerId="LiveId" clId="{27D5CA3F-5A32-4D2C-B1C4-6497C6724676}"/>
     <pc:docChg chg="undo custSel modSld">
-      <pc:chgData name="Erik Holtrop" userId="7c610102d569593a" providerId="LiveId" clId="{27D5CA3F-5A32-4D2C-B1C4-6497C6724676}" dt="2025-04-09T00:07:09.041" v="602" actId="1076"/>
+      <pc:chgData name="Erik Holtrop" userId="7c610102d569593a" providerId="LiveId" clId="{27D5CA3F-5A32-4D2C-B1C4-6497C6724676}" dt="2025-04-10T04:56:41.086" v="1596" actId="20577"/>
       <pc:docMkLst>
         <pc:docMk/>
       </pc:docMkLst>
       <pc:sldChg chg="addSp delSp modSp mod">
-        <pc:chgData name="Erik Holtrop" userId="7c610102d569593a" providerId="LiveId" clId="{27D5CA3F-5A32-4D2C-B1C4-6497C6724676}" dt="2025-04-09T00:07:09.041" v="602" actId="1076"/>
+        <pc:chgData name="Erik Holtrop" userId="7c610102d569593a" providerId="LiveId" clId="{27D5CA3F-5A32-4D2C-B1C4-6497C6724676}" dt="2025-04-10T04:56:41.086" v="1596" actId="20577"/>
         <pc:sldMkLst>
           <pc:docMk/>
           <pc:sldMk cId="0" sldId="256"/>
         </pc:sldMkLst>
+        <pc:spChg chg="mod">
+          <ac:chgData name="Erik Holtrop" userId="7c610102d569593a" providerId="LiveId" clId="{27D5CA3F-5A32-4D2C-B1C4-6497C6724676}" dt="2025-04-10T04:07:13.300" v="802" actId="113"/>
+          <ac:spMkLst>
+            <pc:docMk/>
+            <pc:sldMk cId="0" sldId="256"/>
+            <ac:spMk id="2" creationId="{00000000-0000-0000-0000-000000000000}"/>
+          </ac:spMkLst>
+        </pc:spChg>
         <pc:spChg chg="mod">
           <ac:chgData name="Erik Holtrop" userId="7c610102d569593a" providerId="LiveId" clId="{27D5CA3F-5A32-4D2C-B1C4-6497C6724676}" dt="2025-04-09T00:07:05.031" v="601" actId="14100"/>
           <ac:spMkLst>
@@ -154,12 +162,28 @@
             <ac:spMk id="3" creationId="{02DB5755-5428-F4DC-1B93-8D7323161E59}"/>
           </ac:spMkLst>
         </pc:spChg>
-        <pc:spChg chg="add mod">
-          <ac:chgData name="Erik Holtrop" userId="7c610102d569593a" providerId="LiveId" clId="{27D5CA3F-5A32-4D2C-B1C4-6497C6724676}" dt="2025-04-08T23:41:15.972" v="523" actId="1076"/>
+        <pc:spChg chg="mod">
+          <ac:chgData name="Erik Holtrop" userId="7c610102d569593a" providerId="LiveId" clId="{27D5CA3F-5A32-4D2C-B1C4-6497C6724676}" dt="2025-04-10T04:04:40.660" v="672" actId="1076"/>
           <ac:spMkLst>
             <pc:docMk/>
             <pc:sldMk cId="0" sldId="256"/>
-            <ac:spMk id="5" creationId="{E19D6BF5-EA69-C338-7092-7D0A8F6DC9A0}"/>
+            <ac:spMk id="4" creationId="{00000000-0000-0000-0000-000000000000}"/>
+          </ac:spMkLst>
+        </pc:spChg>
+        <pc:spChg chg="add mod">
+          <ac:chgData name="Erik Holtrop" userId="7c610102d569593a" providerId="LiveId" clId="{27D5CA3F-5A32-4D2C-B1C4-6497C6724676}" dt="2025-04-10T04:05:45.858" v="690" actId="1076"/>
+          <ac:spMkLst>
+            <pc:docMk/>
+            <pc:sldMk cId="0" sldId="256"/>
+            <ac:spMk id="7" creationId="{2EBE0644-00F1-85FB-08EB-6B4E1E51DB95}"/>
+          </ac:spMkLst>
+        </pc:spChg>
+        <pc:spChg chg="del">
+          <ac:chgData name="Erik Holtrop" userId="7c610102d569593a" providerId="LiveId" clId="{27D5CA3F-5A32-4D2C-B1C4-6497C6724676}" dt="2025-04-10T04:12:25.902" v="803" actId="478"/>
+          <ac:spMkLst>
+            <pc:docMk/>
+            <pc:sldMk cId="0" sldId="256"/>
+            <ac:spMk id="9" creationId="{00000000-0000-0000-0000-000000000000}"/>
           </ac:spMkLst>
         </pc:spChg>
         <pc:spChg chg="add mod">
@@ -171,11 +195,43 @@
           </ac:spMkLst>
         </pc:spChg>
         <pc:spChg chg="mod">
+          <ac:chgData name="Erik Holtrop" userId="7c610102d569593a" providerId="LiveId" clId="{27D5CA3F-5A32-4D2C-B1C4-6497C6724676}" dt="2025-04-10T04:56:41.086" v="1596" actId="20577"/>
+          <ac:spMkLst>
+            <pc:docMk/>
+            <pc:sldMk cId="0" sldId="256"/>
+            <ac:spMk id="15" creationId="{00000000-0000-0000-0000-000000000000}"/>
+          </ac:spMkLst>
+        </pc:spChg>
+        <pc:spChg chg="add mod">
+          <ac:chgData name="Erik Holtrop" userId="7c610102d569593a" providerId="LiveId" clId="{27D5CA3F-5A32-4D2C-B1C4-6497C6724676}" dt="2025-04-10T04:47:39.393" v="1468" actId="164"/>
+          <ac:spMkLst>
+            <pc:docMk/>
+            <pc:sldMk cId="0" sldId="256"/>
+            <ac:spMk id="16" creationId="{EE719CD3-AC10-0ED8-9F33-E15613E70058}"/>
+          </ac:spMkLst>
+        </pc:spChg>
+        <pc:spChg chg="mod">
           <ac:chgData name="Erik Holtrop" userId="7c610102d569593a" providerId="LiveId" clId="{27D5CA3F-5A32-4D2C-B1C4-6497C6724676}" dt="2025-04-08T23:43:16.512" v="544" actId="14100"/>
           <ac:spMkLst>
             <pc:docMk/>
             <pc:sldMk cId="0" sldId="256"/>
             <ac:spMk id="18" creationId="{00000000-0000-0000-0000-000000000000}"/>
+          </ac:spMkLst>
+        </pc:spChg>
+        <pc:spChg chg="mod">
+          <ac:chgData name="Erik Holtrop" userId="7c610102d569593a" providerId="LiveId" clId="{27D5CA3F-5A32-4D2C-B1C4-6497C6724676}" dt="2025-04-10T04:54:32.274" v="1498" actId="404"/>
+          <ac:spMkLst>
+            <pc:docMk/>
+            <pc:sldMk cId="0" sldId="256"/>
+            <ac:spMk id="26" creationId="{00000000-0000-0000-0000-000000000000}"/>
+          </ac:spMkLst>
+        </pc:spChg>
+        <pc:spChg chg="mod">
+          <ac:chgData name="Erik Holtrop" userId="7c610102d569593a" providerId="LiveId" clId="{27D5CA3F-5A32-4D2C-B1C4-6497C6724676}" dt="2025-04-10T04:14:59.426" v="1075" actId="20577"/>
+          <ac:spMkLst>
+            <pc:docMk/>
+            <pc:sldMk cId="0" sldId="256"/>
+            <ac:spMk id="29" creationId="{00000000-0000-0000-0000-000000000000}"/>
           </ac:spMkLst>
         </pc:spChg>
         <pc:grpChg chg="add mod">
@@ -186,12 +242,20 @@
             <ac:grpSpMk id="11" creationId="{87FAFD28-D657-131E-B7D1-05D234CD0704}"/>
           </ac:grpSpMkLst>
         </pc:grpChg>
-        <pc:picChg chg="add del mod">
-          <ac:chgData name="Erik Holtrop" userId="7c610102d569593a" providerId="LiveId" clId="{27D5CA3F-5A32-4D2C-B1C4-6497C6724676}" dt="2025-04-08T23:42:18.500" v="533" actId="21"/>
+        <pc:grpChg chg="add mod">
+          <ac:chgData name="Erik Holtrop" userId="7c610102d569593a" providerId="LiveId" clId="{27D5CA3F-5A32-4D2C-B1C4-6497C6724676}" dt="2025-04-10T04:47:44.034" v="1469" actId="1076"/>
+          <ac:grpSpMkLst>
+            <pc:docMk/>
+            <pc:sldMk cId="0" sldId="256"/>
+            <ac:grpSpMk id="17" creationId="{F12239C3-E2C0-3B3F-B5D6-BECBC972B9A6}"/>
+          </ac:grpSpMkLst>
+        </pc:grpChg>
+        <pc:picChg chg="add mod ord">
+          <ac:chgData name="Erik Holtrop" userId="7c610102d569593a" providerId="LiveId" clId="{27D5CA3F-5A32-4D2C-B1C4-6497C6724676}" dt="2025-04-10T04:05:53.233" v="693" actId="1076"/>
           <ac:picMkLst>
             <pc:docMk/>
             <pc:sldMk cId="0" sldId="256"/>
-            <ac:picMk id="7" creationId="{3C19D4BF-49EF-D168-48DA-508F675C00B2}"/>
+            <ac:picMk id="6" creationId="{014A886D-B23C-1390-D36E-E892DA43033C}"/>
           </ac:picMkLst>
         </pc:picChg>
         <pc:picChg chg="add mod">
@@ -200,6 +264,22 @@
             <pc:docMk/>
             <pc:sldMk cId="0" sldId="256"/>
             <ac:picMk id="8" creationId="{3C19D4BF-49EF-D168-48DA-508F675C00B2}"/>
+          </ac:picMkLst>
+        </pc:picChg>
+        <pc:picChg chg="add mod">
+          <ac:chgData name="Erik Holtrop" userId="7c610102d569593a" providerId="LiveId" clId="{27D5CA3F-5A32-4D2C-B1C4-6497C6724676}" dt="2025-04-10T04:12:56.815" v="812" actId="1076"/>
+          <ac:picMkLst>
+            <pc:docMk/>
+            <pc:sldMk cId="0" sldId="256"/>
+            <ac:picMk id="12" creationId="{51DB831C-753A-9319-E2CC-C5D393B53C74}"/>
+          </ac:picMkLst>
+        </pc:picChg>
+        <pc:picChg chg="add mod">
+          <ac:chgData name="Erik Holtrop" userId="7c610102d569593a" providerId="LiveId" clId="{27D5CA3F-5A32-4D2C-B1C4-6497C6724676}" dt="2025-04-10T04:47:39.393" v="1468" actId="164"/>
+          <ac:picMkLst>
+            <pc:docMk/>
+            <pc:sldMk cId="0" sldId="256"/>
+            <ac:picMk id="14" creationId="{D1274EC5-F5C6-41D6-C4C4-6E8AD4C3043C}"/>
           </ac:picMkLst>
         </pc:picChg>
       </pc:sldChg>
@@ -980,7 +1060,12 @@
             <p:ph type="ctrTitle"/>
           </p:nvPr>
         </p:nvSpPr>
-        <p:spPr/>
+        <p:spPr>
+          <a:xfrm>
+            <a:off x="0" y="685800"/>
+            <a:ext cx="43891200" cy="4800600"/>
+          </a:xfrm>
+        </p:spPr>
         <p:txBody>
           <a:bodyPr>
             <a:normAutofit/>
@@ -989,36 +1074,28 @@
           <a:p>
             <a:r>
               <a:rPr lang="en-US" sz="9600" dirty="0"/>
-              <a:t>Title of Poster, Bold, 80-120 points</a:t>
+              <a:t>Mass Spectrometer Interface</a:t>
             </a:r>
             <a:br>
               <a:rPr lang="en-US" sz="9600" dirty="0"/>
             </a:br>
             <a:r>
               <a:rPr lang="en-US" sz="5500" dirty="0"/>
-              <a:t>Sponsor: Sponsoring Company</a:t>
+              <a:t>Sponsor: WSU School of Biology Cousins Lab</a:t>
             </a:r>
             <a:br>
               <a:rPr lang="en-US" sz="5500" dirty="0"/>
             </a:br>
             <a:r>
               <a:rPr lang="en-US" sz="5500" dirty="0"/>
-              <a:t>Mentor(s): Name(s) of Mentor(s)</a:t>
+              <a:t>Mentor: Dr. Asaph Cousins</a:t>
             </a:r>
             <a:br>
               <a:rPr lang="en-US" sz="5500" dirty="0"/>
             </a:br>
             <a:r>
-              <a:rPr lang="en-US" sz="5500" dirty="0"/>
-              <a:t>Names of Team Members, Bold</a:t>
-            </a:r>
-            <a:r>
-              <a:rPr lang="en-US" sz="5500"/>
-              <a:t>, 45-65 </a:t>
-            </a:r>
-            <a:r>
-              <a:rPr lang="en-US" sz="5500" dirty="0"/>
-              <a:t>points</a:t>
+              <a:rPr lang="en-US" sz="5500" b="1" dirty="0"/>
+              <a:t>Erik Holtrop, Kyler Kupp</a:t>
             </a:r>
           </a:p>
         </p:txBody>
@@ -1086,56 +1163,6 @@
       </p:sp>
       <p:sp>
         <p:nvSpPr>
-          <p:cNvPr id="9" name="TextBox 8"/>
-          <p:cNvSpPr txBox="1"/>
-          <p:nvPr/>
-        </p:nvSpPr>
-        <p:spPr>
-          <a:xfrm>
-            <a:off x="37009184" y="1676400"/>
-            <a:ext cx="6348616" cy="2554545"/>
-          </a:xfrm>
-          <a:prstGeom prst="rect">
-            <a:avLst/>
-          </a:prstGeom>
-          <a:noFill/>
-        </p:spPr>
-        <p:txBody>
-          <a:bodyPr wrap="square" rtlCol="0">
-            <a:spAutoFit/>
-          </a:bodyPr>
-          <a:lstStyle/>
-          <a:p>
-            <a:pPr algn="ctr"/>
-            <a:r>
-              <a:rPr lang="en-US" sz="8000" dirty="0">
-                <a:latin typeface="+mj-lt"/>
-              </a:rPr>
-              <a:t>Company</a:t>
-            </a:r>
-            <a:r>
-              <a:rPr lang="en-US" sz="8000" baseline="0" dirty="0">
-                <a:latin typeface="+mj-lt"/>
-              </a:rPr>
-              <a:t> </a:t>
-            </a:r>
-          </a:p>
-          <a:p>
-            <a:pPr algn="ctr"/>
-            <a:r>
-              <a:rPr lang="en-US" sz="8000" baseline="0" dirty="0">
-                <a:latin typeface="+mj-lt"/>
-              </a:rPr>
-              <a:t>Logo</a:t>
-            </a:r>
-            <a:endParaRPr lang="en-US" sz="8000" dirty="0">
-              <a:latin typeface="+mj-lt"/>
-            </a:endParaRPr>
-          </a:p>
-        </p:txBody>
-      </p:sp>
-      <p:sp>
-        <p:nvSpPr>
           <p:cNvPr id="15" name="Content Placeholder 9"/>
           <p:cNvSpPr txBox="1">
             <a:spLocks/>
@@ -1145,7 +1172,7 @@
         <p:spPr>
           <a:xfrm>
             <a:off x="15049500" y="5257800"/>
-            <a:ext cx="13844016" cy="26746200"/>
+            <a:ext cx="13844016" cy="10668000"/>
           </a:xfrm>
           <a:prstGeom prst="rect">
             <a:avLst/>
@@ -1185,7 +1212,7 @@
               <a:tabLst/>
               <a:defRPr/>
             </a:pPr>
-            <a:endParaRPr kumimoji="0" lang="en-US" sz="6000" b="0" i="0" u="none" strike="noStrike" kern="1200" cap="none" spc="0" normalizeH="0" baseline="0" noProof="0" dirty="0">
+            <a:endParaRPr kumimoji="0" lang="en-US" sz="1600" b="1" i="0" u="none" strike="noStrike" kern="1200" cap="none" spc="0" normalizeH="0" baseline="0" noProof="0" dirty="0">
               <a:ln>
                 <a:noFill/>
               </a:ln>
@@ -1195,9 +1222,7 @@
               <a:effectLst/>
               <a:uLnTx/>
               <a:uFillTx/>
-              <a:latin typeface="+mj-lt"/>
-              <a:ea typeface="+mn-ea"/>
-              <a:cs typeface="+mn-cs"/>
+              <a:latin typeface="Aptos" panose="020B0004020202020204" pitchFamily="34" charset="0"/>
             </a:endParaRPr>
           </a:p>
           <a:p>
@@ -1218,23 +1243,24 @@
               <a:tabLst/>
               <a:defRPr/>
             </a:pPr>
-            <a:endParaRPr kumimoji="0" lang="en-US" sz="6000" b="0" i="0" u="none" strike="noStrike" kern="1200" cap="none" spc="0" normalizeH="0" baseline="0" noProof="0" dirty="0">
-              <a:ln>
-                <a:noFill/>
-              </a:ln>
-              <a:solidFill>
-                <a:schemeClr val="tx1"/>
-              </a:solidFill>
-              <a:effectLst/>
-              <a:uLnTx/>
-              <a:uFillTx/>
-              <a:latin typeface="+mj-lt"/>
-              <a:ea typeface="+mn-ea"/>
-              <a:cs typeface="+mn-cs"/>
-            </a:endParaRPr>
-          </a:p>
-          <a:p>
-            <a:pPr marL="1645920" marR="0" lvl="0" indent="-1645920" algn="ctr" defTabSz="4389120" rtl="0" eaLnBrk="1" fontAlgn="auto" latinLnBrk="0" hangingPunct="1">
+            <a:r>
+              <a:rPr kumimoji="0" lang="en-US" sz="6600" b="1" i="0" u="none" strike="noStrike" kern="1200" cap="none" spc="0" normalizeH="0" baseline="0" noProof="0" dirty="0">
+                <a:ln>
+                  <a:noFill/>
+                </a:ln>
+                <a:solidFill>
+                  <a:schemeClr val="tx1"/>
+                </a:solidFill>
+                <a:effectLst/>
+                <a:uLnTx/>
+                <a:uFillTx/>
+                <a:latin typeface="Aptos" panose="020B0004020202020204" pitchFamily="34" charset="0"/>
+              </a:rPr>
+              <a:t>Our Solution: A Powerful Python-based Graph Interface</a:t>
+            </a:r>
+          </a:p>
+          <a:p>
+            <a:pPr marL="1644650" marR="0" lvl="0" indent="-947738" algn="l" defTabSz="4389120" rtl="0" eaLnBrk="1" fontAlgn="auto" latinLnBrk="0" hangingPunct="1">
               <a:lnSpc>
                 <a:spcPct val="100000"/>
               </a:lnSpc>
@@ -1246,13 +1272,13 @@
               </a:spcAft>
               <a:buClrTx/>
               <a:buSzTx/>
-              <a:buFont typeface="Arial" pitchFamily="34" charset="0"/>
-              <a:buNone/>
+              <a:buFont typeface="Arial" panose="020B0604020202020204" pitchFamily="34" charset="0"/>
+              <a:buChar char="•"/>
               <a:tabLst/>
               <a:defRPr/>
             </a:pPr>
             <a:r>
-              <a:rPr kumimoji="0" lang="en-US" sz="6000" b="0" i="0" u="none" strike="noStrike" kern="1200" cap="none" spc="0" normalizeH="0" baseline="0" noProof="0" dirty="0">
+              <a:rPr kumimoji="0" lang="en-US" sz="6000" i="0" u="none" strike="noStrike" kern="1200" cap="none" spc="0" normalizeH="0" baseline="0" noProof="0" dirty="0">
                 <a:ln>
                   <a:noFill/>
                 </a:ln>
@@ -1262,12 +1288,197 @@
                 <a:effectLst/>
                 <a:uLnTx/>
                 <a:uFillTx/>
-                <a:latin typeface="+mj-lt"/>
-                <a:ea typeface="+mn-ea"/>
-                <a:cs typeface="+mn-cs"/>
+                <a:latin typeface="Aptos" panose="020B0004020202020204" pitchFamily="34" charset="0"/>
               </a:rPr>
-              <a:t>Body</a:t>
-            </a:r>
+              <a:t>Process data from CSV’s</a:t>
+            </a:r>
+          </a:p>
+          <a:p>
+            <a:pPr marL="1644650" marR="0" lvl="0" indent="-947738" algn="l" defTabSz="4389120" rtl="0" eaLnBrk="1" fontAlgn="auto" latinLnBrk="0" hangingPunct="1">
+              <a:lnSpc>
+                <a:spcPct val="100000"/>
+              </a:lnSpc>
+              <a:spcBef>
+                <a:spcPct val="20000"/>
+              </a:spcBef>
+              <a:spcAft>
+                <a:spcPts val="0"/>
+              </a:spcAft>
+              <a:buClrTx/>
+              <a:buSzTx/>
+              <a:buFont typeface="Arial" panose="020B0604020202020204" pitchFamily="34" charset="0"/>
+              <a:buChar char="•"/>
+              <a:tabLst/>
+              <a:defRPr/>
+            </a:pPr>
+            <a:r>
+              <a:rPr lang="en-US" sz="6000" dirty="0">
+                <a:latin typeface="Aptos" panose="020B0004020202020204" pitchFamily="34" charset="0"/>
+              </a:rPr>
+              <a:t>Extract relevant datapoints</a:t>
+            </a:r>
+          </a:p>
+          <a:p>
+            <a:pPr marL="1644650" marR="0" lvl="0" indent="-947738" algn="l" defTabSz="4389120" rtl="0" eaLnBrk="1" fontAlgn="auto" latinLnBrk="0" hangingPunct="1">
+              <a:lnSpc>
+                <a:spcPct val="100000"/>
+              </a:lnSpc>
+              <a:spcBef>
+                <a:spcPct val="20000"/>
+              </a:spcBef>
+              <a:spcAft>
+                <a:spcPts val="0"/>
+              </a:spcAft>
+              <a:buClrTx/>
+              <a:buSzTx/>
+              <a:buFont typeface="Arial" panose="020B0604020202020204" pitchFamily="34" charset="0"/>
+              <a:buChar char="•"/>
+              <a:tabLst/>
+              <a:defRPr/>
+            </a:pPr>
+            <a:r>
+              <a:rPr lang="en-US" sz="6000" dirty="0">
+                <a:latin typeface="Aptos" panose="020B0004020202020204" pitchFamily="34" charset="0"/>
+              </a:rPr>
+              <a:t>Calculate derived values</a:t>
+            </a:r>
+          </a:p>
+          <a:p>
+            <a:pPr marL="1644650" marR="0" lvl="0" indent="-947738" algn="l" defTabSz="4389120" rtl="0" eaLnBrk="1" fontAlgn="auto" latinLnBrk="0" hangingPunct="1">
+              <a:lnSpc>
+                <a:spcPct val="100000"/>
+              </a:lnSpc>
+              <a:spcBef>
+                <a:spcPct val="20000"/>
+              </a:spcBef>
+              <a:spcAft>
+                <a:spcPts val="0"/>
+              </a:spcAft>
+              <a:buClrTx/>
+              <a:buSzTx/>
+              <a:buFont typeface="Arial" panose="020B0604020202020204" pitchFamily="34" charset="0"/>
+              <a:buChar char="•"/>
+              <a:tabLst/>
+              <a:defRPr/>
+            </a:pPr>
+            <a:r>
+              <a:rPr lang="en-US" sz="6000" dirty="0">
+                <a:latin typeface="Aptos" panose="020B0004020202020204" pitchFamily="34" charset="0"/>
+              </a:rPr>
+              <a:t>Display data in one or more graphs</a:t>
+            </a:r>
+          </a:p>
+          <a:p>
+            <a:pPr marL="1644650" marR="0" lvl="0" indent="-947738" algn="l" defTabSz="4389120" rtl="0" eaLnBrk="1" fontAlgn="auto" latinLnBrk="0" hangingPunct="1">
+              <a:lnSpc>
+                <a:spcPct val="100000"/>
+              </a:lnSpc>
+              <a:spcBef>
+                <a:spcPct val="20000"/>
+              </a:spcBef>
+              <a:spcAft>
+                <a:spcPts val="0"/>
+              </a:spcAft>
+              <a:buClrTx/>
+              <a:buSzTx/>
+              <a:buFont typeface="Arial" panose="020B0604020202020204" pitchFamily="34" charset="0"/>
+              <a:buChar char="•"/>
+              <a:tabLst/>
+              <a:defRPr/>
+            </a:pPr>
+            <a:r>
+              <a:rPr lang="en-US" sz="6000" dirty="0">
+                <a:latin typeface="Aptos" panose="020B0004020202020204" pitchFamily="34" charset="0"/>
+              </a:rPr>
+              <a:t>Different versions for different situations</a:t>
+            </a:r>
+          </a:p>
+          <a:p>
+            <a:pPr marL="1644650" marR="0" lvl="0" indent="-947738" algn="l" defTabSz="4389120" rtl="0" eaLnBrk="1" fontAlgn="auto" latinLnBrk="0" hangingPunct="1">
+              <a:lnSpc>
+                <a:spcPct val="100000"/>
+              </a:lnSpc>
+              <a:spcBef>
+                <a:spcPct val="20000"/>
+              </a:spcBef>
+              <a:spcAft>
+                <a:spcPts val="0"/>
+              </a:spcAft>
+              <a:buClrTx/>
+              <a:buSzTx/>
+              <a:buFont typeface="Arial" panose="020B0604020202020204" pitchFamily="34" charset="0"/>
+              <a:buChar char="•"/>
+              <a:tabLst/>
+              <a:defRPr/>
+            </a:pPr>
+            <a:r>
+              <a:rPr lang="en-US" sz="6000" dirty="0">
+                <a:latin typeface="Aptos" panose="020B0004020202020204" pitchFamily="34" charset="0"/>
+              </a:rPr>
+              <a:t>Sample or </a:t>
+            </a:r>
+            <a:r>
+              <a:rPr lang="en-US" sz="6000">
+                <a:latin typeface="Aptos" panose="020B0004020202020204" pitchFamily="34" charset="0"/>
+              </a:rPr>
+              <a:t>complete exporting</a:t>
+            </a:r>
+            <a:endParaRPr lang="en-US" sz="6000" dirty="0">
+              <a:latin typeface="Aptos" panose="020B0004020202020204" pitchFamily="34" charset="0"/>
+            </a:endParaRPr>
+          </a:p>
+          <a:p>
+            <a:pPr marL="1644650" marR="0" lvl="0" indent="-947738" algn="l" defTabSz="4389120" rtl="0" eaLnBrk="1" fontAlgn="auto" latinLnBrk="0" hangingPunct="1">
+              <a:lnSpc>
+                <a:spcPct val="100000"/>
+              </a:lnSpc>
+              <a:spcBef>
+                <a:spcPct val="20000"/>
+              </a:spcBef>
+              <a:spcAft>
+                <a:spcPts val="0"/>
+              </a:spcAft>
+              <a:buClrTx/>
+              <a:buSzTx/>
+              <a:buFont typeface="Arial" panose="020B0604020202020204" pitchFamily="34" charset="0"/>
+              <a:buChar char="•"/>
+              <a:tabLst/>
+              <a:defRPr/>
+            </a:pPr>
+            <a:endParaRPr lang="en-US" sz="6000" dirty="0">
+              <a:latin typeface="Aptos" panose="020B0004020202020204" pitchFamily="34" charset="0"/>
+            </a:endParaRPr>
+          </a:p>
+          <a:p>
+            <a:pPr marL="1644650" marR="0" lvl="0" indent="-947738" algn="l" defTabSz="4389120" rtl="0" eaLnBrk="1" fontAlgn="auto" latinLnBrk="0" hangingPunct="1">
+              <a:lnSpc>
+                <a:spcPct val="100000"/>
+              </a:lnSpc>
+              <a:spcBef>
+                <a:spcPct val="20000"/>
+              </a:spcBef>
+              <a:spcAft>
+                <a:spcPts val="0"/>
+              </a:spcAft>
+              <a:buClrTx/>
+              <a:buSzTx/>
+              <a:buFont typeface="Arial" panose="020B0604020202020204" pitchFamily="34" charset="0"/>
+              <a:buChar char="•"/>
+              <a:tabLst/>
+              <a:defRPr/>
+            </a:pPr>
+            <a:endParaRPr kumimoji="0" lang="en-US" sz="6000" i="0" u="none" strike="noStrike" kern="1200" cap="none" spc="0" normalizeH="0" baseline="0" noProof="0" dirty="0">
+              <a:ln>
+                <a:noFill/>
+              </a:ln>
+              <a:solidFill>
+                <a:schemeClr val="tx1"/>
+              </a:solidFill>
+              <a:effectLst/>
+              <a:uLnTx/>
+              <a:uFillTx/>
+              <a:latin typeface="Aptos" panose="020B0004020202020204" pitchFamily="34" charset="0"/>
+            </a:endParaRPr>
           </a:p>
         </p:txBody>
       </p:sp>
@@ -1471,8 +1682,8 @@
               <a:buNone/>
             </a:pPr>
             <a:r>
-              <a:rPr lang="en-US" sz="5200" dirty="0"/>
-              <a:t>Team Name; Bold; 40-60 points</a:t>
+              <a:rPr lang="en-US" sz="6000" b="1" dirty="0"/>
+              <a:t>Team Linnaea Borealis</a:t>
             </a:r>
           </a:p>
         </p:txBody>
@@ -1710,7 +1921,7 @@
                 <a:ea typeface="+mn-ea"/>
                 <a:cs typeface="+mn-cs"/>
               </a:rPr>
-              <a:t>Glossary</a:t>
+              <a:t>Mass Spectrometer – An instrument used to identify the molecular composition of an object, liquid, or gas.</a:t>
             </a:r>
           </a:p>
         </p:txBody>
@@ -1969,6 +2180,217 @@
                   <a:latin typeface="Aptos" panose="020B0004020202020204" pitchFamily="34" charset="0"/>
                 </a:rPr>
                 <a:t>Figure 1: LabVIEW Screenshot</a:t>
+              </a:r>
+              <a:endParaRPr lang="en-US" dirty="0">
+                <a:latin typeface="Aptos" panose="020B0004020202020204" pitchFamily="34" charset="0"/>
+              </a:endParaRPr>
+            </a:p>
+          </p:txBody>
+        </p:sp>
+      </p:grpSp>
+      <p:sp>
+        <p:nvSpPr>
+          <p:cNvPr id="7" name="Rectangle 6">
+            <a:extLst>
+              <a:ext uri="{FF2B5EF4-FFF2-40B4-BE49-F238E27FC236}">
+                <a16:creationId xmlns:a16="http://schemas.microsoft.com/office/drawing/2014/main" id="{2EBE0644-00F1-85FB-08EB-6B4E1E51DB95}"/>
+              </a:ext>
+            </a:extLst>
+          </p:cNvPr>
+          <p:cNvSpPr/>
+          <p:nvPr/>
+        </p:nvSpPr>
+        <p:spPr>
+          <a:xfrm>
+            <a:off x="685800" y="849992"/>
+            <a:ext cx="10058400" cy="3580496"/>
+          </a:xfrm>
+          <a:prstGeom prst="rect">
+            <a:avLst/>
+          </a:prstGeom>
+          <a:solidFill>
+            <a:schemeClr val="bg1"/>
+          </a:solidFill>
+          <a:ln>
+            <a:solidFill>
+              <a:schemeClr val="bg1"/>
+            </a:solidFill>
+          </a:ln>
+        </p:spPr>
+        <p:style>
+          <a:lnRef idx="2">
+            <a:schemeClr val="accent1">
+              <a:shade val="15000"/>
+            </a:schemeClr>
+          </a:lnRef>
+          <a:fillRef idx="1">
+            <a:schemeClr val="accent1"/>
+          </a:fillRef>
+          <a:effectRef idx="0">
+            <a:schemeClr val="accent1"/>
+          </a:effectRef>
+          <a:fontRef idx="minor">
+            <a:schemeClr val="lt1"/>
+          </a:fontRef>
+        </p:style>
+        <p:txBody>
+          <a:bodyPr rtlCol="0" anchor="ctr"/>
+          <a:lstStyle/>
+          <a:p>
+            <a:pPr algn="ctr"/>
+            <a:endParaRPr lang="en-US"/>
+          </a:p>
+        </p:txBody>
+      </p:sp>
+      <p:pic>
+        <p:nvPicPr>
+          <p:cNvPr id="6" name="Graphic 5">
+            <a:extLst>
+              <a:ext uri="{FF2B5EF4-FFF2-40B4-BE49-F238E27FC236}">
+                <a16:creationId xmlns:a16="http://schemas.microsoft.com/office/drawing/2014/main" id="{014A886D-B23C-1390-D36E-E892DA43033C}"/>
+              </a:ext>
+            </a:extLst>
+          </p:cNvPr>
+          <p:cNvPicPr>
+            <a:picLocks noChangeAspect="1"/>
+          </p:cNvPicPr>
+          <p:nvPr/>
+        </p:nvPicPr>
+        <p:blipFill>
+          <a:blip r:embed="rId3">
+            <a:extLst>
+              <a:ext uri="{96DAC541-7B7A-43D3-8B79-37D633B846F1}">
+                <asvg:svgBlip xmlns:asvg="http://schemas.microsoft.com/office/drawing/2016/SVG/main" r:embed="rId4"/>
+              </a:ext>
+            </a:extLst>
+          </a:blip>
+          <a:stretch>
+            <a:fillRect/>
+          </a:stretch>
+        </p:blipFill>
+        <p:spPr>
+          <a:xfrm>
+            <a:off x="685800" y="1774943"/>
+            <a:ext cx="12633552" cy="2357457"/>
+          </a:xfrm>
+          <a:prstGeom prst="rect">
+            <a:avLst/>
+          </a:prstGeom>
+        </p:spPr>
+      </p:pic>
+      <p:pic>
+        <p:nvPicPr>
+          <p:cNvPr id="12" name="image1.jpg">
+            <a:extLst>
+              <a:ext uri="{FF2B5EF4-FFF2-40B4-BE49-F238E27FC236}">
+                <a16:creationId xmlns:a16="http://schemas.microsoft.com/office/drawing/2014/main" id="{51DB831C-753A-9319-E2CC-C5D393B53C74}"/>
+              </a:ext>
+            </a:extLst>
+          </p:cNvPr>
+          <p:cNvPicPr/>
+          <p:nvPr/>
+        </p:nvPicPr>
+        <p:blipFill>
+          <a:blip r:embed="rId5"/>
+          <a:srcRect/>
+          <a:stretch>
+            <a:fillRect/>
+          </a:stretch>
+        </p:blipFill>
+        <p:spPr>
+          <a:xfrm>
+            <a:off x="38785800" y="992117"/>
+            <a:ext cx="3219450" cy="3140283"/>
+          </a:xfrm>
+          <a:prstGeom prst="rect">
+            <a:avLst/>
+          </a:prstGeom>
+          <a:ln/>
+        </p:spPr>
+      </p:pic>
+      <p:grpSp>
+        <p:nvGrpSpPr>
+          <p:cNvPr id="17" name="Group 16">
+            <a:extLst>
+              <a:ext uri="{FF2B5EF4-FFF2-40B4-BE49-F238E27FC236}">
+                <a16:creationId xmlns:a16="http://schemas.microsoft.com/office/drawing/2014/main" id="{F12239C3-E2C0-3B3F-B5D6-BECBC972B9A6}"/>
+              </a:ext>
+            </a:extLst>
+          </p:cNvPr>
+          <p:cNvGrpSpPr/>
+          <p:nvPr/>
+        </p:nvGrpSpPr>
+        <p:grpSpPr>
+          <a:xfrm>
+            <a:off x="15023591" y="16459200"/>
+            <a:ext cx="13844017" cy="8477483"/>
+            <a:chOff x="15023591" y="14961525"/>
+            <a:chExt cx="13844017" cy="8477483"/>
+          </a:xfrm>
+        </p:grpSpPr>
+        <p:pic>
+          <p:nvPicPr>
+            <p:cNvPr id="14" name="Picture 13">
+              <a:extLst>
+                <a:ext uri="{FF2B5EF4-FFF2-40B4-BE49-F238E27FC236}">
+                  <a16:creationId xmlns:a16="http://schemas.microsoft.com/office/drawing/2014/main" id="{D1274EC5-F5C6-41D6-C4C4-6E8AD4C3043C}"/>
+                </a:ext>
+              </a:extLst>
+            </p:cNvPr>
+            <p:cNvPicPr>
+              <a:picLocks noChangeAspect="1"/>
+            </p:cNvPicPr>
+            <p:nvPr/>
+          </p:nvPicPr>
+          <p:blipFill>
+            <a:blip r:embed="rId6"/>
+            <a:stretch>
+              <a:fillRect/>
+            </a:stretch>
+          </p:blipFill>
+          <p:spPr>
+            <a:xfrm>
+              <a:off x="15023591" y="14961525"/>
+              <a:ext cx="13844017" cy="7365075"/>
+            </a:xfrm>
+            <a:prstGeom prst="rect">
+              <a:avLst/>
+            </a:prstGeom>
+          </p:spPr>
+        </p:pic>
+        <p:sp>
+          <p:nvSpPr>
+            <p:cNvPr id="16" name="TextBox 15">
+              <a:extLst>
+                <a:ext uri="{FF2B5EF4-FFF2-40B4-BE49-F238E27FC236}">
+                  <a16:creationId xmlns:a16="http://schemas.microsoft.com/office/drawing/2014/main" id="{EE719CD3-AC10-0ED8-9F33-E15613E70058}"/>
+                </a:ext>
+              </a:extLst>
+            </p:cNvPr>
+            <p:cNvSpPr txBox="1"/>
+            <p:nvPr/>
+          </p:nvSpPr>
+          <p:spPr>
+            <a:xfrm>
+              <a:off x="15410714" y="22423345"/>
+              <a:ext cx="13069770" cy="1015663"/>
+            </a:xfrm>
+            <a:prstGeom prst="rect">
+              <a:avLst/>
+            </a:prstGeom>
+            <a:noFill/>
+          </p:spPr>
+          <p:txBody>
+            <a:bodyPr wrap="square" rtlCol="0">
+              <a:spAutoFit/>
+            </a:bodyPr>
+            <a:lstStyle/>
+            <a:p>
+              <a:r>
+                <a:rPr lang="en-US" sz="6000" dirty="0">
+                  <a:latin typeface="Aptos" panose="020B0004020202020204" pitchFamily="34" charset="0"/>
+                </a:rPr>
+                <a:t>Figure 2: Interface Project Screenshot</a:t>
               </a:r>
               <a:endParaRPr lang="en-US" dirty="0">
                 <a:latin typeface="Aptos" panose="020B0004020202020204" pitchFamily="34" charset="0"/>

</xml_diff>